<commit_message>
cv paraatheid: healthcare research field
</commit_message>
<xml_diff>
--- a/CV Varvara Lazarenko PhD 28082025.pptx
+++ b/CV Varvara Lazarenko PhD 28082025.pptx
@@ -247,7 +247,7 @@
       <p15:sldGuideLst xmlns:p15="http://schemas.microsoft.com/office/powerpoint/2012/main"/>
     </p:ext>
     <p:ext uri="GoogleSlidesCustomDataVersion2">
-      <go:slidesCustomData xmlns="" xmlns:mc="http://schemas.openxmlformats.org/markup-compatibility/2006" xmlns:mv="urn:schemas-microsoft-com:mac:vml" xmlns:c="http://schemas.openxmlformats.org/drawingml/2006/chart" xmlns:dgm="http://schemas.openxmlformats.org/drawingml/2006/diagram" xmlns:o="urn:schemas-microsoft-com:office:office" xmlns:v="urn:schemas-microsoft-com:vml" xmlns:pvml="urn:schemas-microsoft-com:office:powerpoint" xmlns:com="http://schemas.openxmlformats.org/drawingml/2006/compatibility" xmlns:p14="http://schemas.microsoft.com/office/powerpoint/2010/main" xmlns:p15="http://schemas.microsoft.com/office/powerpoint/2012/main" xmlns:ahyp="http://schemas.microsoft.com/office/drawing/2018/hyperlinkcolor" xmlns:go="http://customooxmlschemas.google.com/" r:id="rId23" roundtripDataSignature="AMtx7mjeLRqlypDdHeyNK1HuUcu/GrX6Sg=="/>
+      <go:slidesCustomData xmlns:go="http://customooxmlschemas.google.com/" xmlns:ahyp="http://schemas.microsoft.com/office/drawing/2018/hyperlinkcolor" xmlns:p15="http://schemas.microsoft.com/office/powerpoint/2012/main" xmlns:p14="http://schemas.microsoft.com/office/powerpoint/2010/main" xmlns:com="http://schemas.openxmlformats.org/drawingml/2006/compatibility" xmlns:pvml="urn:schemas-microsoft-com:office:powerpoint" xmlns:v="urn:schemas-microsoft-com:vml" xmlns:o="urn:schemas-microsoft-com:office:office" xmlns:dgm="http://schemas.openxmlformats.org/drawingml/2006/diagram" xmlns:c="http://schemas.openxmlformats.org/drawingml/2006/chart" xmlns:mv="urn:schemas-microsoft-com:mac:vml" xmlns:mc="http://schemas.openxmlformats.org/markup-compatibility/2006" xmlns="" r:id="rId23" roundtripDataSignature="AMtx7mjeLRqlypDdHeyNK1HuUcu/GrX6Sg=="/>
     </p:ext>
   </p:extLst>
 </p:presentation>
@@ -17432,7 +17432,7 @@
                 <a:cs typeface="Verdana"/>
                 <a:sym typeface="Verdana"/>
               </a:rPr>
-              <a:t>Part-time staff while searching for a life sciences position</a:t>
+              <a:t>Part-time staff while searching for a position in the healthcare research field</a:t>
             </a:r>
           </a:p>
           <a:p>

</xml_diff>